<commit_message>
Updated presentation with our GitHub usernames
</commit_message>
<xml_diff>
--- a/Presentation/CSC505Presentation2.pptx
+++ b/Presentation/CSC505Presentation2.pptx
@@ -17497,7 +17497,7 @@
         <p:spPr>
           <a:xfrm>
             <a:off x="824000" y="3596300"/>
-            <a:ext cx="4255500" cy="695400"/>
+            <a:ext cx="5262000" cy="918900"/>
           </a:xfrm>
           <a:prstGeom prst="rect">
             <a:avLst/>
@@ -17520,7 +17520,7 @@
             </a:pPr>
             <a:r>
               <a:rPr lang="en"/>
-              <a:t>By: Gregory Purvine, Evan Crabtree, Cody Cothern, Rohit Gulia, Vincent Xiao</a:t>
+              <a:t>By: Gregory Purvine (gnpurvin), Evan Crabtree (crabtr), Cody Cothern (Mask487), Rohit Gulia (rohit-gulia), Vincent Xiao (MrVinegar)</a:t>
             </a:r>
             <a:endParaRPr/>
           </a:p>

</xml_diff>